<commit_message>
updated Presentation and added an example
added the topics Interpolarische Quadraturformel and weitere Quadraturformeln
added an example for the presentation
</commit_message>
<xml_diff>
--- a/Numerische Integration/Numerische Integration.pptx
+++ b/Numerische Integration/Numerische Integration.pptx
@@ -10,7 +10,9 @@
     <p:sldId id="258" r:id="rId4"/>
     <p:sldId id="260" r:id="rId5"/>
     <p:sldId id="261" r:id="rId6"/>
-    <p:sldId id="259" r:id="rId7"/>
+    <p:sldId id="263" r:id="rId7"/>
+    <p:sldId id="262" r:id="rId8"/>
+    <p:sldId id="259" r:id="rId9"/>
   </p:sldIdLst>
   <p:sldSz cx="12192000" cy="6858000"/>
   <p:notesSz cx="6858000" cy="9144000"/>
@@ -266,7 +268,7 @@
           <a:p>
             <a:fld id="{C3390442-A57B-4B01-B237-E5688989AD00}" type="datetimeFigureOut">
               <a:rPr lang="de-AT" smtClean="0"/>
-              <a:t>23.05.2022</a:t>
+              <a:t>13.06.2022</a:t>
             </a:fld>
             <a:endParaRPr lang="de-AT"/>
           </a:p>
@@ -466,7 +468,7 @@
           <a:p>
             <a:fld id="{C3390442-A57B-4B01-B237-E5688989AD00}" type="datetimeFigureOut">
               <a:rPr lang="de-AT" smtClean="0"/>
-              <a:t>23.05.2022</a:t>
+              <a:t>13.06.2022</a:t>
             </a:fld>
             <a:endParaRPr lang="de-AT"/>
           </a:p>
@@ -676,7 +678,7 @@
           <a:p>
             <a:fld id="{C3390442-A57B-4B01-B237-E5688989AD00}" type="datetimeFigureOut">
               <a:rPr lang="de-AT" smtClean="0"/>
-              <a:t>23.05.2022</a:t>
+              <a:t>13.06.2022</a:t>
             </a:fld>
             <a:endParaRPr lang="de-AT"/>
           </a:p>
@@ -876,7 +878,7 @@
           <a:p>
             <a:fld id="{C3390442-A57B-4B01-B237-E5688989AD00}" type="datetimeFigureOut">
               <a:rPr lang="de-AT" smtClean="0"/>
-              <a:t>23.05.2022</a:t>
+              <a:t>13.06.2022</a:t>
             </a:fld>
             <a:endParaRPr lang="de-AT"/>
           </a:p>
@@ -1152,7 +1154,7 @@
           <a:p>
             <a:fld id="{C3390442-A57B-4B01-B237-E5688989AD00}" type="datetimeFigureOut">
               <a:rPr lang="de-AT" smtClean="0"/>
-              <a:t>23.05.2022</a:t>
+              <a:t>13.06.2022</a:t>
             </a:fld>
             <a:endParaRPr lang="de-AT"/>
           </a:p>
@@ -1420,7 +1422,7 @@
           <a:p>
             <a:fld id="{C3390442-A57B-4B01-B237-E5688989AD00}" type="datetimeFigureOut">
               <a:rPr lang="de-AT" smtClean="0"/>
-              <a:t>23.05.2022</a:t>
+              <a:t>13.06.2022</a:t>
             </a:fld>
             <a:endParaRPr lang="de-AT"/>
           </a:p>
@@ -1835,7 +1837,7 @@
           <a:p>
             <a:fld id="{C3390442-A57B-4B01-B237-E5688989AD00}" type="datetimeFigureOut">
               <a:rPr lang="de-AT" smtClean="0"/>
-              <a:t>23.05.2022</a:t>
+              <a:t>13.06.2022</a:t>
             </a:fld>
             <a:endParaRPr lang="de-AT"/>
           </a:p>
@@ -1977,7 +1979,7 @@
           <a:p>
             <a:fld id="{C3390442-A57B-4B01-B237-E5688989AD00}" type="datetimeFigureOut">
               <a:rPr lang="de-AT" smtClean="0"/>
-              <a:t>23.05.2022</a:t>
+              <a:t>13.06.2022</a:t>
             </a:fld>
             <a:endParaRPr lang="de-AT"/>
           </a:p>
@@ -2090,7 +2092,7 @@
           <a:p>
             <a:fld id="{C3390442-A57B-4B01-B237-E5688989AD00}" type="datetimeFigureOut">
               <a:rPr lang="de-AT" smtClean="0"/>
-              <a:t>23.05.2022</a:t>
+              <a:t>13.06.2022</a:t>
             </a:fld>
             <a:endParaRPr lang="de-AT"/>
           </a:p>
@@ -2403,7 +2405,7 @@
           <a:p>
             <a:fld id="{C3390442-A57B-4B01-B237-E5688989AD00}" type="datetimeFigureOut">
               <a:rPr lang="de-AT" smtClean="0"/>
-              <a:t>23.05.2022</a:t>
+              <a:t>13.06.2022</a:t>
             </a:fld>
             <a:endParaRPr lang="de-AT"/>
           </a:p>
@@ -2692,7 +2694,7 @@
           <a:p>
             <a:fld id="{C3390442-A57B-4B01-B237-E5688989AD00}" type="datetimeFigureOut">
               <a:rPr lang="de-AT" smtClean="0"/>
-              <a:t>23.05.2022</a:t>
+              <a:t>13.06.2022</a:t>
             </a:fld>
             <a:endParaRPr lang="de-AT"/>
           </a:p>
@@ -2935,7 +2937,7 @@
           <a:p>
             <a:fld id="{C3390442-A57B-4B01-B237-E5688989AD00}" type="datetimeFigureOut">
               <a:rPr lang="de-AT" smtClean="0"/>
-              <a:t>23.05.2022</a:t>
+              <a:t>13.06.2022</a:t>
             </a:fld>
             <a:endParaRPr lang="de-AT"/>
           </a:p>
@@ -4130,6 +4132,397 @@
           <p:cNvPr id="2" name="Titel 1">
             <a:extLst>
               <a:ext uri="{FF2B5EF4-FFF2-40B4-BE49-F238E27FC236}">
+                <a16:creationId xmlns:a16="http://schemas.microsoft.com/office/drawing/2014/main" id="{E209E717-E972-7C72-1CF7-AB5FD8F8DC38}"/>
+              </a:ext>
+            </a:extLst>
+          </p:cNvPr>
+          <p:cNvSpPr>
+            <a:spLocks noGrp="1"/>
+          </p:cNvSpPr>
+          <p:nvPr>
+            <p:ph type="title"/>
+          </p:nvPr>
+        </p:nvSpPr>
+        <p:spPr/>
+        <p:txBody>
+          <a:bodyPr/>
+          <a:lstStyle/>
+          <a:p>
+            <a:r>
+              <a:rPr lang="de-DE" dirty="0" err="1"/>
+              <a:t>Interpolarische</a:t>
+            </a:r>
+            <a:r>
+              <a:rPr lang="de-DE" dirty="0"/>
+              <a:t> Quadraturformel	</a:t>
+            </a:r>
+            <a:endParaRPr lang="de-AT" dirty="0"/>
+          </a:p>
+        </p:txBody>
+      </p:sp>
+      <mc:AlternateContent xmlns:mc="http://schemas.openxmlformats.org/markup-compatibility/2006">
+        <mc:Choice xmlns:a14="http://schemas.microsoft.com/office/drawing/2010/main" Requires="a14">
+          <p:sp>
+            <p:nvSpPr>
+              <p:cNvPr id="3" name="Inhaltsplatzhalter 2">
+                <a:extLst>
+                  <a:ext uri="{FF2B5EF4-FFF2-40B4-BE49-F238E27FC236}">
+                    <a16:creationId xmlns:a16="http://schemas.microsoft.com/office/drawing/2014/main" id="{1060F695-DF48-C06D-3229-1EA456018847}"/>
+                  </a:ext>
+                </a:extLst>
+              </p:cNvPr>
+              <p:cNvSpPr>
+                <a:spLocks noGrp="1"/>
+              </p:cNvSpPr>
+              <p:nvPr>
+                <p:ph idx="1"/>
+              </p:nvPr>
+            </p:nvSpPr>
+            <p:spPr>
+              <a:xfrm>
+                <a:off x="829322" y="1825625"/>
+                <a:ext cx="10515600" cy="4351338"/>
+              </a:xfrm>
+            </p:spPr>
+            <p:txBody>
+              <a:bodyPr/>
+              <a:lstStyle/>
+              <a:p>
+                <a:r>
+                  <a:rPr lang="de-DE" dirty="0"/>
+                  <a:t>Funktion f(</a:t>
+                </a:r>
+                <a:r>
+                  <a:rPr lang="de-DE" i="1" dirty="0"/>
+                  <a:t>x</a:t>
+                </a:r>
+                <a:r>
+                  <a:rPr lang="de-DE" dirty="0"/>
+                  <a:t>) mit Interpolationspolynom </a:t>
+                </a:r>
+                <a:br>
+                  <a:rPr lang="de-DE" dirty="0"/>
+                </a:br>
+                <a14:m>
+                  <m:oMath xmlns:m="http://schemas.openxmlformats.org/officeDocument/2006/math">
+                    <m:sSub>
+                      <m:sSubPr>
+                        <m:ctrlPr>
+                          <a:rPr lang="de-DE" i="1" smtClean="0">
+                            <a:latin typeface="Cambria Math" panose="02040503050406030204" pitchFamily="18" charset="0"/>
+                          </a:rPr>
+                        </m:ctrlPr>
+                      </m:sSubPr>
+                      <m:e>
+                        <m:r>
+                          <a:rPr lang="de-DE" b="0" i="1" smtClean="0">
+                            <a:latin typeface="Cambria Math" panose="02040503050406030204" pitchFamily="18" charset="0"/>
+                          </a:rPr>
+                          <m:t>𝑝</m:t>
+                        </m:r>
+                      </m:e>
+                      <m:sub>
+                        <m:r>
+                          <a:rPr lang="de-DE" b="0" i="1" smtClean="0">
+                            <a:latin typeface="Cambria Math" panose="02040503050406030204" pitchFamily="18" charset="0"/>
+                          </a:rPr>
+                          <m:t>𝑛</m:t>
+                        </m:r>
+                      </m:sub>
+                    </m:sSub>
+                  </m:oMath>
+                </a14:m>
+                <a:r>
+                  <a:rPr lang="de-DE" dirty="0"/>
+                  <a:t>(x) approximieren und integrieren</a:t>
+                </a:r>
+              </a:p>
+              <a:p>
+                <a:pPr lvl="1"/>
+                <a:r>
+                  <a:rPr lang="de-DE" dirty="0"/>
+                  <a:t>Nach der Konstruktion hat die Formel</a:t>
+                </a:r>
+                <a:br>
+                  <a:rPr lang="de-DE" dirty="0"/>
+                </a:br>
+                <a:r>
+                  <a:rPr lang="de-DE" dirty="0"/>
+                  <a:t>eine Genauigkeit von </a:t>
+                </a:r>
+                <a:r>
+                  <a:rPr lang="de-DE" i="1" dirty="0"/>
+                  <a:t>n</a:t>
+                </a:r>
+              </a:p>
+              <a:p>
+                <a:r>
+                  <a:rPr lang="de-AT" dirty="0"/>
+                  <a:t>Falls die Integrationsgrenzen Stützstellen</a:t>
+                </a:r>
+                <a:br>
+                  <a:rPr lang="de-AT" dirty="0"/>
+                </a:br>
+                <a:r>
+                  <a:rPr lang="de-AT" dirty="0"/>
+                  <a:t>spricht man von einer</a:t>
+                </a:r>
+              </a:p>
+              <a:p>
+                <a:pPr lvl="1"/>
+                <a:r>
+                  <a:rPr lang="de-AT" dirty="0"/>
+                  <a:t>Abgeschlossenen Quadraturformel sonst von einer </a:t>
+                </a:r>
+              </a:p>
+              <a:p>
+                <a:pPr lvl="1"/>
+                <a:r>
+                  <a:rPr lang="de-AT" dirty="0"/>
+                  <a:t>Offenen Quadraturformel</a:t>
+                </a:r>
+              </a:p>
+            </p:txBody>
+          </p:sp>
+        </mc:Choice>
+        <mc:Fallback>
+          <p:sp>
+            <p:nvSpPr>
+              <p:cNvPr id="3" name="Inhaltsplatzhalter 2">
+                <a:extLst>
+                  <a:ext uri="{FF2B5EF4-FFF2-40B4-BE49-F238E27FC236}">
+                    <a16:creationId xmlns:a16="http://schemas.microsoft.com/office/drawing/2014/main" id="{1060F695-DF48-C06D-3229-1EA456018847}"/>
+                  </a:ext>
+                </a:extLst>
+              </p:cNvPr>
+              <p:cNvSpPr>
+                <a:spLocks noGrp="1" noRot="1" noChangeAspect="1" noMove="1" noResize="1" noEditPoints="1" noAdjustHandles="1" noChangeArrowheads="1" noChangeShapeType="1" noTextEdit="1"/>
+              </p:cNvSpPr>
+              <p:nvPr>
+                <p:ph idx="1"/>
+              </p:nvPr>
+            </p:nvSpPr>
+            <p:spPr>
+              <a:xfrm>
+                <a:off x="829322" y="1825625"/>
+                <a:ext cx="10515600" cy="4351338"/>
+              </a:xfrm>
+              <a:blipFill>
+                <a:blip r:embed="rId2"/>
+                <a:stretch>
+                  <a:fillRect l="-1043" t="-2241"/>
+                </a:stretch>
+              </a:blipFill>
+            </p:spPr>
+            <p:txBody>
+              <a:bodyPr/>
+              <a:lstStyle/>
+              <a:p>
+                <a:r>
+                  <a:rPr lang="de-AT">
+                    <a:noFill/>
+                  </a:rPr>
+                  <a:t> </a:t>
+                </a:r>
+              </a:p>
+            </p:txBody>
+          </p:sp>
+        </mc:Fallback>
+      </mc:AlternateContent>
+      <p:pic>
+        <p:nvPicPr>
+          <p:cNvPr id="5" name="Grafik 4">
+            <a:extLst>
+              <a:ext uri="{FF2B5EF4-FFF2-40B4-BE49-F238E27FC236}">
+                <a16:creationId xmlns:a16="http://schemas.microsoft.com/office/drawing/2014/main" id="{44E5FD0C-3440-6DA8-D358-6E763DF644FD}"/>
+              </a:ext>
+            </a:extLst>
+          </p:cNvPr>
+          <p:cNvPicPr>
+            <a:picLocks noChangeAspect="1"/>
+          </p:cNvPicPr>
+          <p:nvPr/>
+        </p:nvPicPr>
+        <p:blipFill>
+          <a:blip r:embed="rId3"/>
+          <a:stretch>
+            <a:fillRect/>
+          </a:stretch>
+        </p:blipFill>
+        <p:spPr>
+          <a:xfrm>
+            <a:off x="6946297" y="2381249"/>
+            <a:ext cx="4229690" cy="657317"/>
+          </a:xfrm>
+          <a:prstGeom prst="rect">
+            <a:avLst/>
+          </a:prstGeom>
+        </p:spPr>
+      </p:pic>
+      <p:pic>
+        <p:nvPicPr>
+          <p:cNvPr id="7" name="Grafik 6">
+            <a:extLst>
+              <a:ext uri="{FF2B5EF4-FFF2-40B4-BE49-F238E27FC236}">
+                <a16:creationId xmlns:a16="http://schemas.microsoft.com/office/drawing/2014/main" id="{9AB39635-5BE6-77AB-9AA0-6A3EDE6B4DAE}"/>
+              </a:ext>
+            </a:extLst>
+          </p:cNvPr>
+          <p:cNvPicPr>
+            <a:picLocks noChangeAspect="1"/>
+          </p:cNvPicPr>
+          <p:nvPr/>
+        </p:nvPicPr>
+        <p:blipFill>
+          <a:blip r:embed="rId4"/>
+          <a:stretch>
+            <a:fillRect/>
+          </a:stretch>
+        </p:blipFill>
+        <p:spPr>
+          <a:xfrm>
+            <a:off x="8925234" y="4226711"/>
+            <a:ext cx="2419688" cy="762106"/>
+          </a:xfrm>
+          <a:prstGeom prst="rect">
+            <a:avLst/>
+          </a:prstGeom>
+        </p:spPr>
+      </p:pic>
+    </p:spTree>
+    <p:extLst>
+      <p:ext uri="{BB962C8B-B14F-4D97-AF65-F5344CB8AC3E}">
+        <p14:creationId xmlns:p14="http://schemas.microsoft.com/office/powerpoint/2010/main" val="3246562543"/>
+      </p:ext>
+    </p:extLst>
+  </p:cSld>
+  <p:clrMapOvr>
+    <a:masterClrMapping/>
+  </p:clrMapOvr>
+</p:sld>
+</file>
+
+<file path=ppt/slides/slide7.xml><?xml version="1.0" encoding="utf-8"?>
+<p:sld xmlns:a="http://schemas.openxmlformats.org/drawingml/2006/main" xmlns:r="http://schemas.openxmlformats.org/officeDocument/2006/relationships" xmlns:p="http://schemas.openxmlformats.org/presentationml/2006/main">
+  <p:cSld>
+    <p:spTree>
+      <p:nvGrpSpPr>
+        <p:cNvPr id="1" name=""/>
+        <p:cNvGrpSpPr/>
+        <p:nvPr/>
+      </p:nvGrpSpPr>
+      <p:grpSpPr>
+        <a:xfrm>
+          <a:off x="0" y="0"/>
+          <a:ext cx="0" cy="0"/>
+          <a:chOff x="0" y="0"/>
+          <a:chExt cx="0" cy="0"/>
+        </a:xfrm>
+      </p:grpSpPr>
+      <p:sp>
+        <p:nvSpPr>
+          <p:cNvPr id="2" name="Titel 1">
+            <a:extLst>
+              <a:ext uri="{FF2B5EF4-FFF2-40B4-BE49-F238E27FC236}">
+                <a16:creationId xmlns:a16="http://schemas.microsoft.com/office/drawing/2014/main" id="{28107CED-B1A0-037E-CFCB-914C69337704}"/>
+              </a:ext>
+            </a:extLst>
+          </p:cNvPr>
+          <p:cNvSpPr>
+            <a:spLocks noGrp="1"/>
+          </p:cNvSpPr>
+          <p:nvPr>
+            <p:ph type="title"/>
+          </p:nvPr>
+        </p:nvSpPr>
+        <p:spPr/>
+        <p:txBody>
+          <a:bodyPr/>
+          <a:lstStyle/>
+          <a:p>
+            <a:r>
+              <a:rPr lang="de-DE" dirty="0"/>
+              <a:t>Weitere Quadraturformeln</a:t>
+            </a:r>
+            <a:endParaRPr lang="de-AT" dirty="0"/>
+          </a:p>
+        </p:txBody>
+      </p:sp>
+      <p:sp>
+        <p:nvSpPr>
+          <p:cNvPr id="3" name="Inhaltsplatzhalter 2">
+            <a:extLst>
+              <a:ext uri="{FF2B5EF4-FFF2-40B4-BE49-F238E27FC236}">
+                <a16:creationId xmlns:a16="http://schemas.microsoft.com/office/drawing/2014/main" id="{01F01C4D-B224-891F-BC8A-FBB746A2FDE1}"/>
+              </a:ext>
+            </a:extLst>
+          </p:cNvPr>
+          <p:cNvSpPr>
+            <a:spLocks noGrp="1"/>
+          </p:cNvSpPr>
+          <p:nvPr>
+            <p:ph idx="1"/>
+          </p:nvPr>
+        </p:nvSpPr>
+        <p:spPr/>
+        <p:txBody>
+          <a:bodyPr/>
+          <a:lstStyle/>
+          <a:p>
+            <a:r>
+              <a:rPr lang="de-DE" dirty="0"/>
+              <a:t>Summierte Quadraturformel</a:t>
+            </a:r>
+          </a:p>
+          <a:p>
+            <a:endParaRPr lang="de-DE" dirty="0"/>
+          </a:p>
+          <a:p>
+            <a:r>
+              <a:rPr lang="de-DE" dirty="0"/>
+              <a:t>Monte-Carlo-Integration</a:t>
+            </a:r>
+          </a:p>
+          <a:p>
+            <a:endParaRPr lang="de-AT" dirty="0"/>
+          </a:p>
+        </p:txBody>
+      </p:sp>
+    </p:spTree>
+    <p:extLst>
+      <p:ext uri="{BB962C8B-B14F-4D97-AF65-F5344CB8AC3E}">
+        <p14:creationId xmlns:p14="http://schemas.microsoft.com/office/powerpoint/2010/main" val="4030124169"/>
+      </p:ext>
+    </p:extLst>
+  </p:cSld>
+  <p:clrMapOvr>
+    <a:masterClrMapping/>
+  </p:clrMapOvr>
+</p:sld>
+</file>
+
+<file path=ppt/slides/slide8.xml><?xml version="1.0" encoding="utf-8"?>
+<p:sld xmlns:a="http://schemas.openxmlformats.org/drawingml/2006/main" xmlns:r="http://schemas.openxmlformats.org/officeDocument/2006/relationships" xmlns:p="http://schemas.openxmlformats.org/presentationml/2006/main">
+  <p:cSld>
+    <p:spTree>
+      <p:nvGrpSpPr>
+        <p:cNvPr id="1" name=""/>
+        <p:cNvGrpSpPr/>
+        <p:nvPr/>
+      </p:nvGrpSpPr>
+      <p:grpSpPr>
+        <a:xfrm>
+          <a:off x="0" y="0"/>
+          <a:ext cx="0" cy="0"/>
+          <a:chOff x="0" y="0"/>
+          <a:chExt cx="0" cy="0"/>
+        </a:xfrm>
+      </p:grpSpPr>
+      <p:sp>
+        <p:nvSpPr>
+          <p:cNvPr id="2" name="Titel 1">
+            <a:extLst>
+              <a:ext uri="{FF2B5EF4-FFF2-40B4-BE49-F238E27FC236}">
                 <a16:creationId xmlns:a16="http://schemas.microsoft.com/office/drawing/2014/main" id="{B97A4BF9-D290-B81C-710B-9041BD996190}"/>
               </a:ext>
             </a:extLst>

</xml_diff>